<commit_message>
MAJ du schéma cinématique
</commit_message>
<xml_diff>
--- a/Mecanismes/020_RoueMotriceDirectrice/Schemas/Schemas.pptx
+++ b/Mecanismes/020_RoueMotriceDirectrice/Schemas/Schemas.pptx
@@ -291,7 +291,7 @@
             <a:fld id="{AA309A6D-C09C-4548-B29A-6CF363A7E532}" type="datetimeFigureOut">
               <a:rPr lang="fr-FR" smtClean="0"/>
               <a:pPr/>
-              <a:t>19/02/2013</a:t>
+              <a:t>28/11/2014</a:t>
             </a:fld>
             <a:endParaRPr lang="fr-BE"/>
           </a:p>
@@ -565,7 +565,7 @@
             <a:fld id="{AA309A6D-C09C-4548-B29A-6CF363A7E532}" type="datetimeFigureOut">
               <a:rPr lang="fr-FR" smtClean="0"/>
               <a:pPr/>
-              <a:t>19/02/2013</a:t>
+              <a:t>28/11/2014</a:t>
             </a:fld>
             <a:endParaRPr lang="fr-BE"/>
           </a:p>
@@ -815,7 +815,7 @@
             <a:fld id="{AA309A6D-C09C-4548-B29A-6CF363A7E532}" type="datetimeFigureOut">
               <a:rPr lang="fr-FR" smtClean="0"/>
               <a:pPr/>
-              <a:t>19/02/2013</a:t>
+              <a:t>28/11/2014</a:t>
             </a:fld>
             <a:endParaRPr lang="fr-BE"/>
           </a:p>
@@ -982,7 +982,7 @@
             <a:fld id="{AA309A6D-C09C-4548-B29A-6CF363A7E532}" type="datetimeFigureOut">
               <a:rPr lang="fr-FR" smtClean="0"/>
               <a:pPr/>
-              <a:t>19/02/2013</a:t>
+              <a:t>28/11/2014</a:t>
             </a:fld>
             <a:endParaRPr lang="fr-BE"/>
           </a:p>
@@ -1159,7 +1159,7 @@
             <a:fld id="{AA309A6D-C09C-4548-B29A-6CF363A7E532}" type="datetimeFigureOut">
               <a:rPr lang="fr-FR" smtClean="0"/>
               <a:pPr/>
-              <a:t>19/02/2013</a:t>
+              <a:t>28/11/2014</a:t>
             </a:fld>
             <a:endParaRPr lang="fr-BE"/>
           </a:p>
@@ -1326,7 +1326,7 @@
             <a:fld id="{AA309A6D-C09C-4548-B29A-6CF363A7E532}" type="datetimeFigureOut">
               <a:rPr lang="fr-FR" smtClean="0"/>
               <a:pPr/>
-              <a:t>19/02/2013</a:t>
+              <a:t>28/11/2014</a:t>
             </a:fld>
             <a:endParaRPr lang="fr-BE"/>
           </a:p>
@@ -1569,7 +1569,7 @@
             <a:fld id="{AA309A6D-C09C-4548-B29A-6CF363A7E532}" type="datetimeFigureOut">
               <a:rPr lang="fr-FR" smtClean="0"/>
               <a:pPr/>
-              <a:t>19/02/2013</a:t>
+              <a:t>28/11/2014</a:t>
             </a:fld>
             <a:endParaRPr lang="fr-BE"/>
           </a:p>
@@ -1854,7 +1854,7 @@
             <a:fld id="{AA309A6D-C09C-4548-B29A-6CF363A7E532}" type="datetimeFigureOut">
               <a:rPr lang="fr-FR" smtClean="0"/>
               <a:pPr/>
-              <a:t>19/02/2013</a:t>
+              <a:t>28/11/2014</a:t>
             </a:fld>
             <a:endParaRPr lang="fr-BE"/>
           </a:p>
@@ -2273,7 +2273,7 @@
             <a:fld id="{AA309A6D-C09C-4548-B29A-6CF363A7E532}" type="datetimeFigureOut">
               <a:rPr lang="fr-FR" smtClean="0"/>
               <a:pPr/>
-              <a:t>19/02/2013</a:t>
+              <a:t>28/11/2014</a:t>
             </a:fld>
             <a:endParaRPr lang="fr-BE"/>
           </a:p>
@@ -2388,7 +2388,7 @@
             <a:fld id="{AA309A6D-C09C-4548-B29A-6CF363A7E532}" type="datetimeFigureOut">
               <a:rPr lang="fr-FR" smtClean="0"/>
               <a:pPr/>
-              <a:t>19/02/2013</a:t>
+              <a:t>28/11/2014</a:t>
             </a:fld>
             <a:endParaRPr lang="fr-BE"/>
           </a:p>
@@ -2480,7 +2480,7 @@
             <a:fld id="{AA309A6D-C09C-4548-B29A-6CF363A7E532}" type="datetimeFigureOut">
               <a:rPr lang="fr-FR" smtClean="0"/>
               <a:pPr/>
-              <a:t>19/02/2013</a:t>
+              <a:t>28/11/2014</a:t>
             </a:fld>
             <a:endParaRPr lang="fr-BE"/>
           </a:p>
@@ -2572,7 +2572,7 @@
             <a:fld id="{AA309A6D-C09C-4548-B29A-6CF363A7E532}" type="datetimeFigureOut">
               <a:rPr lang="fr-FR" smtClean="0"/>
               <a:pPr/>
-              <a:t>19/02/2013</a:t>
+              <a:t>28/11/2014</a:t>
             </a:fld>
             <a:endParaRPr lang="fr-BE"/>
           </a:p>
@@ -2745,7 +2745,7 @@
             <a:fld id="{AA309A6D-C09C-4548-B29A-6CF363A7E532}" type="datetimeFigureOut">
               <a:rPr lang="fr-FR" smtClean="0"/>
               <a:pPr/>
-              <a:t>19/02/2013</a:t>
+              <a:t>28/11/2014</a:t>
             </a:fld>
             <a:endParaRPr lang="fr-BE"/>
           </a:p>
@@ -3036,7 +3036,7 @@
             <a:fld id="{AA309A6D-C09C-4548-B29A-6CF363A7E532}" type="datetimeFigureOut">
               <a:rPr lang="fr-FR" smtClean="0"/>
               <a:pPr/>
-              <a:t>19/02/2013</a:t>
+              <a:t>28/11/2014</a:t>
             </a:fld>
             <a:endParaRPr lang="fr-BE"/>
           </a:p>
@@ -3412,13 +3412,15 @@
       <p:cxnSp>
         <p:nvCxnSpPr>
           <p:cNvPr id="2" name="Connecteur droit 1"/>
-          <p:cNvCxnSpPr/>
+          <p:cNvCxnSpPr>
+            <a:stCxn id="66" idx="6"/>
+          </p:cNvCxnSpPr>
           <p:nvPr/>
         </p:nvCxnSpPr>
         <p:spPr>
-          <a:xfrm rot="5400000">
-            <a:off x="4071140" y="785794"/>
-            <a:ext cx="858050" cy="794"/>
+          <a:xfrm>
+            <a:off x="4499748" y="838412"/>
+            <a:ext cx="20" cy="376804"/>
           </a:xfrm>
           <a:prstGeom prst="line">
             <a:avLst/>
@@ -4011,9 +4013,9 @@
           <p:nvPr/>
         </p:nvCxnSpPr>
         <p:spPr>
-          <a:xfrm rot="5400000">
-            <a:off x="3036083" y="2678901"/>
-            <a:ext cx="1500198" cy="1588"/>
+          <a:xfrm>
+            <a:off x="3785388" y="2884856"/>
+            <a:ext cx="0" cy="544938"/>
           </a:xfrm>
           <a:prstGeom prst="line">
             <a:avLst/>
@@ -4087,64 +4089,18 @@
           </a:p>
         </p:txBody>
       </p:sp>
-      <p:sp>
-        <p:nvSpPr>
-          <p:cNvPr id="43" name="Rectangle 42"/>
-          <p:cNvSpPr/>
-          <p:nvPr/>
-        </p:nvSpPr>
-        <p:spPr>
-          <a:xfrm>
-            <a:off x="3571868" y="2643182"/>
-            <a:ext cx="428628" cy="142876"/>
-          </a:xfrm>
-          <a:prstGeom prst="rect">
-            <a:avLst/>
-          </a:prstGeom>
-          <a:solidFill>
-            <a:schemeClr val="bg1"/>
-          </a:solidFill>
-          <a:ln>
-            <a:solidFill>
-              <a:srgbClr val="7030A0"/>
-            </a:solidFill>
-          </a:ln>
-        </p:spPr>
-        <p:style>
-          <a:lnRef idx="2">
-            <a:schemeClr val="accent1">
-              <a:shade val="50000"/>
-            </a:schemeClr>
-          </a:lnRef>
-          <a:fillRef idx="1">
-            <a:schemeClr val="accent1"/>
-          </a:fillRef>
-          <a:effectRef idx="0">
-            <a:schemeClr val="accent1"/>
-          </a:effectRef>
-          <a:fontRef idx="minor">
-            <a:schemeClr val="lt1"/>
-          </a:fontRef>
-        </p:style>
-        <p:txBody>
-          <a:bodyPr rtlCol="0" anchor="ctr"/>
-          <a:lstStyle/>
-          <a:p>
-            <a:pPr algn="ctr"/>
-            <a:endParaRPr lang="fr-FR"/>
-          </a:p>
-        </p:txBody>
-      </p:sp>
       <p:cxnSp>
         <p:nvCxnSpPr>
           <p:cNvPr id="38" name="Connecteur droit 37"/>
-          <p:cNvCxnSpPr/>
+          <p:cNvCxnSpPr>
+            <a:stCxn id="77" idx="2"/>
+          </p:cNvCxnSpPr>
           <p:nvPr/>
         </p:nvCxnSpPr>
         <p:spPr>
           <a:xfrm flipH="1">
-            <a:off x="3357554" y="2714620"/>
-            <a:ext cx="782398" cy="0"/>
+            <a:off x="3357554" y="2703895"/>
+            <a:ext cx="300694" cy="1205"/>
           </a:xfrm>
           <a:prstGeom prst="line">
             <a:avLst/>
@@ -4181,54 +4137,6 @@
         <p:spPr>
           <a:xfrm>
             <a:off x="4071934" y="1714488"/>
-            <a:ext cx="428628" cy="142876"/>
-          </a:xfrm>
-          <a:prstGeom prst="rect">
-            <a:avLst/>
-          </a:prstGeom>
-          <a:noFill/>
-          <a:ln>
-            <a:solidFill>
-              <a:schemeClr val="accent6">
-                <a:lumMod val="75000"/>
-              </a:schemeClr>
-            </a:solidFill>
-          </a:ln>
-        </p:spPr>
-        <p:style>
-          <a:lnRef idx="2">
-            <a:schemeClr val="accent1">
-              <a:shade val="50000"/>
-            </a:schemeClr>
-          </a:lnRef>
-          <a:fillRef idx="1">
-            <a:schemeClr val="accent1"/>
-          </a:fillRef>
-          <a:effectRef idx="0">
-            <a:schemeClr val="accent1"/>
-          </a:effectRef>
-          <a:fontRef idx="minor">
-            <a:schemeClr val="lt1"/>
-          </a:fontRef>
-        </p:style>
-        <p:txBody>
-          <a:bodyPr rtlCol="0" anchor="ctr"/>
-          <a:lstStyle/>
-          <a:p>
-            <a:pPr algn="ctr"/>
-            <a:endParaRPr lang="fr-FR"/>
-          </a:p>
-        </p:txBody>
-      </p:sp>
-      <p:sp>
-        <p:nvSpPr>
-          <p:cNvPr id="45" name="Rectangle 44"/>
-          <p:cNvSpPr/>
-          <p:nvPr/>
-        </p:nvSpPr>
-        <p:spPr>
-          <a:xfrm rot="5400000">
-            <a:off x="4286248" y="611180"/>
             <a:ext cx="428628" cy="142876"/>
           </a:xfrm>
           <a:prstGeom prst="rect">
@@ -4349,9 +4257,9 @@
           <p:nvPr/>
         </p:nvCxnSpPr>
         <p:spPr>
-          <a:xfrm rot="10800000">
+          <a:xfrm flipH="1">
             <a:off x="3357554" y="714356"/>
-            <a:ext cx="1071570" cy="1588"/>
+            <a:ext cx="961233" cy="0"/>
           </a:xfrm>
           <a:prstGeom prst="line">
             <a:avLst/>
@@ -5159,80 +5067,6 @@
       </p:sp>
       <p:cxnSp>
         <p:nvCxnSpPr>
-          <p:cNvPr id="51" name="Connecteur droit 50"/>
-          <p:cNvCxnSpPr/>
-          <p:nvPr/>
-        </p:nvCxnSpPr>
-        <p:spPr>
-          <a:xfrm>
-            <a:off x="3519887" y="2644895"/>
-            <a:ext cx="0" cy="148308"/>
-          </a:xfrm>
-          <a:prstGeom prst="line">
-            <a:avLst/>
-          </a:prstGeom>
-          <a:ln w="19050">
-            <a:solidFill>
-              <a:schemeClr val="accent6">
-                <a:lumMod val="75000"/>
-              </a:schemeClr>
-            </a:solidFill>
-          </a:ln>
-        </p:spPr>
-        <p:style>
-          <a:lnRef idx="1">
-            <a:schemeClr val="accent1"/>
-          </a:lnRef>
-          <a:fillRef idx="0">
-            <a:schemeClr val="accent1"/>
-          </a:fillRef>
-          <a:effectRef idx="0">
-            <a:schemeClr val="accent1"/>
-          </a:effectRef>
-          <a:fontRef idx="minor">
-            <a:schemeClr val="tx1"/>
-          </a:fontRef>
-        </p:style>
-      </p:cxnSp>
-      <p:cxnSp>
-        <p:nvCxnSpPr>
-          <p:cNvPr id="53" name="Connecteur droit 52"/>
-          <p:cNvCxnSpPr/>
-          <p:nvPr/>
-        </p:nvCxnSpPr>
-        <p:spPr>
-          <a:xfrm>
-            <a:off x="4071934" y="2644895"/>
-            <a:ext cx="0" cy="148308"/>
-          </a:xfrm>
-          <a:prstGeom prst="line">
-            <a:avLst/>
-          </a:prstGeom>
-          <a:ln w="19050">
-            <a:solidFill>
-              <a:schemeClr val="accent6">
-                <a:lumMod val="75000"/>
-              </a:schemeClr>
-            </a:solidFill>
-          </a:ln>
-        </p:spPr>
-        <p:style>
-          <a:lnRef idx="1">
-            <a:schemeClr val="accent1"/>
-          </a:lnRef>
-          <a:fillRef idx="0">
-            <a:schemeClr val="accent1"/>
-          </a:fillRef>
-          <a:effectRef idx="0">
-            <a:schemeClr val="accent1"/>
-          </a:effectRef>
-          <a:fontRef idx="minor">
-            <a:schemeClr val="tx1"/>
-          </a:fontRef>
-        </p:style>
-      </p:cxnSp>
-      <p:cxnSp>
-        <p:nvCxnSpPr>
           <p:cNvPr id="54" name="Connecteur droit 53"/>
           <p:cNvCxnSpPr/>
           <p:nvPr/>
@@ -5371,16 +5205,173 @@
           </a:fontRef>
         </p:style>
       </p:cxnSp>
+      <p:sp>
+        <p:nvSpPr>
+          <p:cNvPr id="66" name="Ellipse 65"/>
+          <p:cNvSpPr/>
+          <p:nvPr/>
+        </p:nvSpPr>
+        <p:spPr>
+          <a:xfrm rot="5400000">
+            <a:off x="4372608" y="584133"/>
+            <a:ext cx="254280" cy="254278"/>
+          </a:xfrm>
+          <a:prstGeom prst="ellipse">
+            <a:avLst/>
+          </a:prstGeom>
+          <a:ln w="19050">
+            <a:solidFill>
+              <a:srgbClr val="FF0000"/>
+            </a:solidFill>
+          </a:ln>
+        </p:spPr>
+        <p:style>
+          <a:lnRef idx="1">
+            <a:schemeClr val="accent1"/>
+          </a:lnRef>
+          <a:fillRef idx="0">
+            <a:schemeClr val="accent1"/>
+          </a:fillRef>
+          <a:effectRef idx="0">
+            <a:schemeClr val="accent1"/>
+          </a:effectRef>
+          <a:fontRef idx="minor">
+            <a:schemeClr val="tx1"/>
+          </a:fontRef>
+        </p:style>
+        <p:txBody>
+          <a:bodyPr rtlCol="0" anchor="ctr"/>
+          <a:lstStyle/>
+          <a:p>
+            <a:pPr algn="ctr"/>
+            <a:endParaRPr lang="fr-FR" b="1">
+              <a:ln w="28575">
+                <a:solidFill>
+                  <a:schemeClr val="tx1"/>
+                </a:solidFill>
+              </a:ln>
+            </a:endParaRPr>
+          </a:p>
+        </p:txBody>
+      </p:sp>
+      <p:sp>
+        <p:nvSpPr>
+          <p:cNvPr id="71" name="Arc 70"/>
+          <p:cNvSpPr/>
+          <p:nvPr/>
+        </p:nvSpPr>
+        <p:spPr>
+          <a:xfrm rot="5400000">
+            <a:off x="4318787" y="530311"/>
+            <a:ext cx="361922" cy="361922"/>
+          </a:xfrm>
+          <a:prstGeom prst="arc">
+            <a:avLst>
+              <a:gd name="adj1" fmla="val 914488"/>
+              <a:gd name="adj2" fmla="val 9600803"/>
+            </a:avLst>
+          </a:prstGeom>
+          <a:ln w="19050">
+            <a:solidFill>
+              <a:schemeClr val="accent6">
+                <a:lumMod val="75000"/>
+              </a:schemeClr>
+            </a:solidFill>
+          </a:ln>
+        </p:spPr>
+        <p:style>
+          <a:lnRef idx="1">
+            <a:schemeClr val="accent1"/>
+          </a:lnRef>
+          <a:fillRef idx="0">
+            <a:schemeClr val="accent1"/>
+          </a:fillRef>
+          <a:effectRef idx="0">
+            <a:schemeClr val="accent1"/>
+          </a:effectRef>
+          <a:fontRef idx="minor">
+            <a:schemeClr val="tx1"/>
+          </a:fontRef>
+        </p:style>
+        <p:txBody>
+          <a:bodyPr rtlCol="0" anchor="ctr"/>
+          <a:lstStyle/>
+          <a:p>
+            <a:pPr algn="ctr"/>
+            <a:endParaRPr lang="fr-FR">
+              <a:ln w="19050">
+                <a:solidFill>
+                  <a:schemeClr val="tx1"/>
+                </a:solidFill>
+              </a:ln>
+            </a:endParaRPr>
+          </a:p>
+        </p:txBody>
+      </p:sp>
+      <p:sp>
+        <p:nvSpPr>
+          <p:cNvPr id="72" name="Arc 71"/>
+          <p:cNvSpPr/>
+          <p:nvPr/>
+        </p:nvSpPr>
+        <p:spPr>
+          <a:xfrm rot="16200000">
+            <a:off x="4318787" y="530311"/>
+            <a:ext cx="361922" cy="361922"/>
+          </a:xfrm>
+          <a:prstGeom prst="arc">
+            <a:avLst>
+              <a:gd name="adj1" fmla="val 914488"/>
+              <a:gd name="adj2" fmla="val 9600803"/>
+            </a:avLst>
+          </a:prstGeom>
+          <a:ln w="19050">
+            <a:solidFill>
+              <a:schemeClr val="accent6">
+                <a:lumMod val="75000"/>
+              </a:schemeClr>
+            </a:solidFill>
+          </a:ln>
+        </p:spPr>
+        <p:style>
+          <a:lnRef idx="1">
+            <a:schemeClr val="accent1"/>
+          </a:lnRef>
+          <a:fillRef idx="0">
+            <a:schemeClr val="accent1"/>
+          </a:fillRef>
+          <a:effectRef idx="0">
+            <a:schemeClr val="accent1"/>
+          </a:effectRef>
+          <a:fontRef idx="minor">
+            <a:schemeClr val="tx1"/>
+          </a:fontRef>
+        </p:style>
+        <p:txBody>
+          <a:bodyPr rtlCol="0" anchor="ctr"/>
+          <a:lstStyle/>
+          <a:p>
+            <a:pPr algn="ctr"/>
+            <a:endParaRPr lang="fr-FR">
+              <a:ln w="19050">
+                <a:solidFill>
+                  <a:schemeClr val="tx1"/>
+                </a:solidFill>
+              </a:ln>
+            </a:endParaRPr>
+          </a:p>
+        </p:txBody>
+      </p:sp>
       <p:cxnSp>
         <p:nvCxnSpPr>
-          <p:cNvPr id="61" name="Connecteur droit 60"/>
+          <p:cNvPr id="73" name="Connecteur droit 72"/>
           <p:cNvCxnSpPr/>
           <p:nvPr/>
         </p:nvCxnSpPr>
         <p:spPr>
-          <a:xfrm rot="16200000">
-            <a:off x="4497846" y="873529"/>
-            <a:ext cx="0" cy="148308"/>
+          <a:xfrm>
+            <a:off x="4499748" y="206694"/>
+            <a:ext cx="20" cy="376804"/>
           </a:xfrm>
           <a:prstGeom prst="line">
             <a:avLst/>
@@ -5406,23 +5397,179 @@
           </a:fontRef>
         </p:style>
       </p:cxnSp>
+      <p:sp>
+        <p:nvSpPr>
+          <p:cNvPr id="77" name="Ellipse 76"/>
+          <p:cNvSpPr/>
+          <p:nvPr/>
+        </p:nvSpPr>
+        <p:spPr>
+          <a:xfrm>
+            <a:off x="3658248" y="2576756"/>
+            <a:ext cx="254280" cy="254278"/>
+          </a:xfrm>
+          <a:prstGeom prst="ellipse">
+            <a:avLst/>
+          </a:prstGeom>
+          <a:noFill/>
+          <a:ln w="19050">
+            <a:solidFill>
+              <a:schemeClr val="accent6">
+                <a:lumMod val="75000"/>
+              </a:schemeClr>
+            </a:solidFill>
+          </a:ln>
+        </p:spPr>
+        <p:style>
+          <a:lnRef idx="1">
+            <a:schemeClr val="accent3"/>
+          </a:lnRef>
+          <a:fillRef idx="2">
+            <a:schemeClr val="accent3"/>
+          </a:fillRef>
+          <a:effectRef idx="1">
+            <a:schemeClr val="accent3"/>
+          </a:effectRef>
+          <a:fontRef idx="minor">
+            <a:schemeClr val="dk1"/>
+          </a:fontRef>
+        </p:style>
+        <p:txBody>
+          <a:bodyPr rtlCol="0" anchor="ctr"/>
+          <a:lstStyle/>
+          <a:p>
+            <a:pPr algn="ctr"/>
+            <a:endParaRPr lang="fr-FR" b="1">
+              <a:ln w="28575">
+                <a:solidFill>
+                  <a:schemeClr val="tx1"/>
+                </a:solidFill>
+              </a:ln>
+            </a:endParaRPr>
+          </a:p>
+        </p:txBody>
+      </p:sp>
+      <p:sp>
+        <p:nvSpPr>
+          <p:cNvPr id="79" name="Arc 78"/>
+          <p:cNvSpPr/>
+          <p:nvPr/>
+        </p:nvSpPr>
+        <p:spPr>
+          <a:xfrm>
+            <a:off x="3604427" y="2522934"/>
+            <a:ext cx="361922" cy="361922"/>
+          </a:xfrm>
+          <a:prstGeom prst="arc">
+            <a:avLst>
+              <a:gd name="adj1" fmla="val 914488"/>
+              <a:gd name="adj2" fmla="val 9600803"/>
+            </a:avLst>
+          </a:prstGeom>
+          <a:ln w="19050">
+            <a:solidFill>
+              <a:srgbClr val="7030A0"/>
+            </a:solidFill>
+          </a:ln>
+        </p:spPr>
+        <p:style>
+          <a:lnRef idx="1">
+            <a:schemeClr val="accent1"/>
+          </a:lnRef>
+          <a:fillRef idx="0">
+            <a:schemeClr val="accent1"/>
+          </a:fillRef>
+          <a:effectRef idx="0">
+            <a:schemeClr val="accent1"/>
+          </a:effectRef>
+          <a:fontRef idx="minor">
+            <a:schemeClr val="tx1"/>
+          </a:fontRef>
+        </p:style>
+        <p:txBody>
+          <a:bodyPr rtlCol="0" anchor="ctr"/>
+          <a:lstStyle/>
+          <a:p>
+            <a:pPr algn="ctr"/>
+            <a:endParaRPr lang="fr-FR">
+              <a:ln w="19050">
+                <a:solidFill>
+                  <a:schemeClr val="tx1"/>
+                </a:solidFill>
+              </a:ln>
+            </a:endParaRPr>
+          </a:p>
+        </p:txBody>
+      </p:sp>
+      <p:sp>
+        <p:nvSpPr>
+          <p:cNvPr id="81" name="Arc 80"/>
+          <p:cNvSpPr/>
+          <p:nvPr/>
+        </p:nvSpPr>
+        <p:spPr>
+          <a:xfrm rot="10800000">
+            <a:off x="3604427" y="2522934"/>
+            <a:ext cx="361922" cy="361922"/>
+          </a:xfrm>
+          <a:prstGeom prst="arc">
+            <a:avLst>
+              <a:gd name="adj1" fmla="val 914488"/>
+              <a:gd name="adj2" fmla="val 9600803"/>
+            </a:avLst>
+          </a:prstGeom>
+          <a:ln w="19050">
+            <a:solidFill>
+              <a:srgbClr val="7030A0"/>
+            </a:solidFill>
+          </a:ln>
+        </p:spPr>
+        <p:style>
+          <a:lnRef idx="1">
+            <a:schemeClr val="accent1"/>
+          </a:lnRef>
+          <a:fillRef idx="0">
+            <a:schemeClr val="accent1"/>
+          </a:fillRef>
+          <a:effectRef idx="0">
+            <a:schemeClr val="accent1"/>
+          </a:effectRef>
+          <a:fontRef idx="minor">
+            <a:schemeClr val="tx1"/>
+          </a:fontRef>
+        </p:style>
+        <p:txBody>
+          <a:bodyPr rtlCol="0" anchor="ctr"/>
+          <a:lstStyle/>
+          <a:p>
+            <a:pPr algn="ctr"/>
+            <a:endParaRPr lang="fr-FR">
+              <a:ln w="19050">
+                <a:solidFill>
+                  <a:schemeClr val="tx1"/>
+                </a:solidFill>
+              </a:ln>
+            </a:endParaRPr>
+          </a:p>
+        </p:txBody>
+      </p:sp>
       <p:cxnSp>
         <p:nvCxnSpPr>
-          <p:cNvPr id="62" name="Connecteur droit 61"/>
+          <p:cNvPr id="83" name="Connecteur droit 82"/>
           <p:cNvCxnSpPr/>
           <p:nvPr/>
         </p:nvCxnSpPr>
         <p:spPr>
-          <a:xfrm rot="16200000">
-            <a:off x="4499768" y="330511"/>
-            <a:ext cx="0" cy="148308"/>
+          <a:xfrm>
+            <a:off x="3796495" y="1930390"/>
+            <a:ext cx="0" cy="580074"/>
           </a:xfrm>
           <a:prstGeom prst="line">
             <a:avLst/>
           </a:prstGeom>
           <a:ln w="19050">
             <a:solidFill>
-              <a:srgbClr val="FF0000"/>
+              <a:srgbClr val="7030A0"/>
             </a:solidFill>
           </a:ln>
         </p:spPr>

</xml_diff>